<commit_message>
new version for Bioseq part
</commit_message>
<xml_diff>
--- a/slides/python_biopython_SeqAnnotation_Object.pptx
+++ b/slides/python_biopython_SeqAnnotation_Object.pptx
@@ -13945,36 +13945,6 @@
           <a:xfrm>
             <a:off x="0" y="4973335"/>
             <a:ext cx="3311174" cy="1646520"/>
-          </a:xfrm>
-          <a:prstGeom prst="rect">
-            <a:avLst/>
-          </a:prstGeom>
-        </p:spPr>
-      </p:pic>
-      <p:pic>
-        <p:nvPicPr>
-          <p:cNvPr id="3" name="Image 2" descr="biopython_logo.png"/>
-          <p:cNvPicPr>
-            <a:picLocks noChangeAspect="1"/>
-          </p:cNvPicPr>
-          <p:nvPr/>
-        </p:nvPicPr>
-        <p:blipFill>
-          <a:blip r:embed="rId4">
-            <a:extLst>
-              <a:ext uri="{28A0092B-C50C-407E-A947-70E740481C1C}">
-                <a14:useLocalDpi xmlns:a14="http://schemas.microsoft.com/office/drawing/2010/main" val="0"/>
-              </a:ext>
-            </a:extLst>
-          </a:blip>
-          <a:stretch>
-            <a:fillRect/>
-          </a:stretch>
-        </p:blipFill>
-        <p:spPr>
-          <a:xfrm>
-            <a:off x="2846249" y="3946398"/>
-            <a:ext cx="4082269" cy="1396035"/>
           </a:xfrm>
           <a:prstGeom prst="rect">
             <a:avLst/>

</xml_diff>